<commit_message>
Subindo com mais slides em formato texto.
</commit_message>
<xml_diff>
--- a/stack-overflow.pptx
+++ b/stack-overflow.pptx
@@ -26,23 +26,24 @@
     <p:sldId id="271" r:id="rId20"/>
     <p:sldId id="272" r:id="rId21"/>
     <p:sldId id="273" r:id="rId22"/>
+    <p:sldId id="274" r:id="rId23"/>
   </p:sldIdLst>
   <p:sldSz cy="5143500" cx="9144000"/>
   <p:notesSz cx="6858000" cy="9144000"/>
   <p:embeddedFontLst>
     <p:embeddedFont>
       <p:font typeface="Economica"/>
-      <p:regular r:id="rId23"/>
-      <p:bold r:id="rId24"/>
-      <p:italic r:id="rId25"/>
-      <p:boldItalic r:id="rId26"/>
+      <p:regular r:id="rId24"/>
+      <p:bold r:id="rId25"/>
+      <p:italic r:id="rId26"/>
+      <p:boldItalic r:id="rId27"/>
     </p:embeddedFont>
     <p:embeddedFont>
       <p:font typeface="Open Sans"/>
-      <p:regular r:id="rId27"/>
-      <p:bold r:id="rId28"/>
-      <p:italic r:id="rId29"/>
-      <p:boldItalic r:id="rId30"/>
+      <p:regular r:id="rId28"/>
+      <p:bold r:id="rId29"/>
+      <p:italic r:id="rId30"/>
+      <p:boldItalic r:id="rId31"/>
     </p:embeddedFont>
   </p:embeddedFontLst>
   <p:defaultTextStyle>
@@ -1233,7 +1234,7 @@
           </a:bodyPr>
           <a:lstStyle/>
           <a:p>
-            <a:pPr lvl="0" rtl="0">
+            <a:pPr lvl="0">
               <a:spcBef>
                 <a:spcPts val="0"/>
               </a:spcBef>
@@ -1259,7 +1260,7 @@
   <p:cSld>
     <p:spTree>
       <p:nvGrpSpPr>
-        <p:cNvPr id="154" name="Shape 154"/>
+        <p:cNvPr id="155" name="Shape 155"/>
         <p:cNvGrpSpPr/>
         <p:nvPr/>
       </p:nvGrpSpPr>
@@ -1273,7 +1274,7 @@
       </p:grpSpPr>
       <p:sp>
         <p:nvSpPr>
-          <p:cNvPr id="155" name="Shape 155"/>
+          <p:cNvPr id="156" name="Shape 156"/>
           <p:cNvSpPr/>
           <p:nvPr>
             <p:ph idx="2" type="sldImg"/>
@@ -1307,7 +1308,102 @@
       </p:sp>
       <p:sp>
         <p:nvSpPr>
-          <p:cNvPr id="156" name="Shape 156"/>
+          <p:cNvPr id="157" name="Shape 157"/>
+          <p:cNvSpPr txBox="1"/>
+          <p:nvPr>
+            <p:ph idx="1" type="body"/>
+          </p:nvPr>
+        </p:nvSpPr>
+        <p:spPr>
+          <a:xfrm>
+            <a:off x="685800" y="4343400"/>
+            <a:ext cx="5486400" cy="4114800"/>
+          </a:xfrm>
+          <a:prstGeom prst="rect">
+            <a:avLst/>
+          </a:prstGeom>
+        </p:spPr>
+        <p:txBody>
+          <a:bodyPr anchorCtr="0" anchor="t" bIns="91425" lIns="91425" rIns="91425" tIns="91425">
+            <a:noAutofit/>
+          </a:bodyPr>
+          <a:lstStyle/>
+          <a:p>
+            <a:pPr lvl="0" rtl="0">
+              <a:spcBef>
+                <a:spcPts val="0"/>
+              </a:spcBef>
+              <a:buNone/>
+            </a:pPr>
+            <a:r>
+              <a:t/>
+            </a:r>
+            <a:endParaRPr/>
+          </a:p>
+        </p:txBody>
+      </p:sp>
+    </p:spTree>
+  </p:cSld>
+  <p:clrMapOvr>
+    <a:masterClrMapping/>
+  </p:clrMapOvr>
+</p:notes>
+</file>
+
+<file path=ppt/notesSlides/notesSlide19.xml><?xml version="1.0" encoding="utf-8"?>
+<p:notes xmlns:a="http://schemas.openxmlformats.org/drawingml/2006/main" xmlns:r="http://schemas.openxmlformats.org/officeDocument/2006/relationships" xmlns:mc="http://schemas.openxmlformats.org/markup-compatibility/2006" xmlns:mv="urn:schemas-microsoft-com:mac:vml" xmlns:p="http://schemas.openxmlformats.org/presentationml/2006/main" xmlns:c="http://schemas.openxmlformats.org/drawingml/2006/chart" xmlns:dgm="http://schemas.openxmlformats.org/drawingml/2006/diagram" xmlns:o="urn:schemas-microsoft-com:office:office" xmlns:v="urn:schemas-microsoft-com:vml" xmlns:pvml="urn:schemas-microsoft-com:office:powerpoint" xmlns:com="http://schemas.openxmlformats.org/drawingml/2006/compatibility" xmlns:p14="http://schemas.microsoft.com/office/powerpoint/2010/main" showMasterPhAnim="0" showMasterSp="0">
+  <p:cSld>
+    <p:spTree>
+      <p:nvGrpSpPr>
+        <p:cNvPr id="160" name="Shape 160"/>
+        <p:cNvGrpSpPr/>
+        <p:nvPr/>
+      </p:nvGrpSpPr>
+      <p:grpSpPr>
+        <a:xfrm>
+          <a:off x="0" y="0"/>
+          <a:ext cx="0" cy="0"/>
+          <a:chOff x="0" y="0"/>
+          <a:chExt cx="0" cy="0"/>
+        </a:xfrm>
+      </p:grpSpPr>
+      <p:sp>
+        <p:nvSpPr>
+          <p:cNvPr id="161" name="Shape 161"/>
+          <p:cNvSpPr/>
+          <p:nvPr>
+            <p:ph idx="2" type="sldImg"/>
+          </p:nvPr>
+        </p:nvSpPr>
+        <p:spPr>
+          <a:xfrm>
+            <a:off x="381300" y="685800"/>
+            <a:ext cx="6096000" cy="3429000"/>
+          </a:xfrm>
+          <a:custGeom>
+            <a:pathLst>
+              <a:path extrusionOk="0" h="120000" w="120000">
+                <a:moveTo>
+                  <a:pt x="0" y="0"/>
+                </a:moveTo>
+                <a:lnTo>
+                  <a:pt x="120000" y="0"/>
+                </a:lnTo>
+                <a:lnTo>
+                  <a:pt x="120000" y="120000"/>
+                </a:lnTo>
+                <a:lnTo>
+                  <a:pt x="0" y="120000"/>
+                </a:lnTo>
+                <a:close/>
+              </a:path>
+            </a:pathLst>
+          </a:custGeom>
+        </p:spPr>
+      </p:sp>
+      <p:sp>
+        <p:nvSpPr>
+          <p:cNvPr id="162" name="Shape 162"/>
           <p:cNvSpPr txBox="1"/>
           <p:nvPr>
             <p:ph idx="1" type="body"/>
@@ -6617,34 +6713,111 @@
           <a:chExt cx="0" cy="0"/>
         </a:xfrm>
       </p:grpSpPr>
-      <p:pic>
-        <p:nvPicPr>
+      <p:sp>
+        <p:nvSpPr>
           <p:cNvPr id="153" name="Shape 153"/>
-          <p:cNvPicPr preferRelativeResize="0"/>
-          <p:nvPr/>
-        </p:nvPicPr>
-        <p:blipFill>
-          <a:blip r:embed="rId3">
-            <a:alphaModFix/>
-          </a:blip>
-          <a:stretch>
-            <a:fillRect/>
-          </a:stretch>
-        </p:blipFill>
-        <p:spPr>
-          <a:xfrm>
-            <a:off x="1243113" y="319000"/>
-            <a:ext cx="6657773" cy="4505500"/>
-          </a:xfrm>
-          <a:prstGeom prst="rect">
-            <a:avLst/>
-          </a:prstGeom>
-          <a:noFill/>
-          <a:ln>
-            <a:noFill/>
-          </a:ln>
-        </p:spPr>
-      </p:pic>
+          <p:cNvSpPr txBox="1"/>
+          <p:nvPr>
+            <p:ph type="title"/>
+          </p:nvPr>
+        </p:nvSpPr>
+        <p:spPr>
+          <a:xfrm>
+            <a:off x="311700" y="315925"/>
+            <a:ext cx="8520600" cy="831300"/>
+          </a:xfrm>
+          <a:prstGeom prst="rect">
+            <a:avLst/>
+          </a:prstGeom>
+        </p:spPr>
+        <p:txBody>
+          <a:bodyPr anchorCtr="0" anchor="b" bIns="91425" lIns="91425" rIns="91425" tIns="91425">
+            <a:noAutofit/>
+          </a:bodyPr>
+          <a:lstStyle/>
+          <a:p>
+            <a:pPr lvl="0">
+              <a:spcBef>
+                <a:spcPts val="0"/>
+              </a:spcBef>
+              <a:buNone/>
+            </a:pPr>
+            <a:r>
+              <a:rPr lang="en"/>
+              <a:t>Partes obscuras</a:t>
+            </a:r>
+          </a:p>
+        </p:txBody>
+      </p:sp>
+      <p:sp>
+        <p:nvSpPr>
+          <p:cNvPr id="154" name="Shape 154"/>
+          <p:cNvSpPr txBox="1"/>
+          <p:nvPr>
+            <p:ph idx="1" type="body"/>
+          </p:nvPr>
+        </p:nvSpPr>
+        <p:spPr>
+          <a:xfrm>
+            <a:off x="311700" y="1225225"/>
+            <a:ext cx="8520600" cy="3354000"/>
+          </a:xfrm>
+          <a:prstGeom prst="rect">
+            <a:avLst/>
+          </a:prstGeom>
+        </p:spPr>
+        <p:txBody>
+          <a:bodyPr anchorCtr="0" anchor="t" bIns="91425" lIns="91425" rIns="91425" tIns="91425">
+            <a:noAutofit/>
+          </a:bodyPr>
+          <a:lstStyle/>
+          <a:p>
+            <a:pPr indent="0" lvl="0" marL="0" rtl="0">
+              <a:spcBef>
+                <a:spcPts val="0"/>
+              </a:spcBef>
+              <a:buNone/>
+            </a:pPr>
+            <a:r>
+              <a:rPr lang="en"/>
+              <a:t>Favor ler readme.md do projeto no GitHub [1]</a:t>
+            </a:r>
+          </a:p>
+          <a:p>
+            <a:pPr indent="0" lvl="0" marL="0" rtl="0">
+              <a:spcBef>
+                <a:spcPts val="0"/>
+              </a:spcBef>
+              <a:buNone/>
+            </a:pPr>
+            <a:r>
+              <a:rPr lang="en"/>
+              <a:t>[1] </a:t>
+            </a:r>
+            <a:r>
+              <a:rPr lang="en" u="sng">
+                <a:solidFill>
+                  <a:schemeClr val="hlink"/>
+                </a:solidFill>
+                <a:hlinkClick r:id="rId3"/>
+              </a:rPr>
+              <a:t>https://github.com/Caloni/StackOverflow</a:t>
+            </a:r>
+          </a:p>
+          <a:p>
+            <a:pPr indent="0" lvl="0" marL="0">
+              <a:spcBef>
+                <a:spcPts val="0"/>
+              </a:spcBef>
+              <a:buNone/>
+            </a:pPr>
+            <a:r>
+              <a:t/>
+            </a:r>
+            <a:endParaRPr/>
+          </a:p>
+        </p:txBody>
+      </p:sp>
     </p:spTree>
   </p:cSld>
   <p:clrMapOvr>
@@ -6659,16 +6832,9 @@
 <file path=ppt/slides/slide18.xml><?xml version="1.0" encoding="utf-8"?>
 <p:sld xmlns:a="http://schemas.openxmlformats.org/drawingml/2006/main" xmlns:r="http://schemas.openxmlformats.org/officeDocument/2006/relationships" xmlns:mc="http://schemas.openxmlformats.org/markup-compatibility/2006" xmlns:mv="urn:schemas-microsoft-com:mac:vml" xmlns:p="http://schemas.openxmlformats.org/presentationml/2006/main" xmlns:c="http://schemas.openxmlformats.org/drawingml/2006/chart" xmlns:dgm="http://schemas.openxmlformats.org/drawingml/2006/diagram" xmlns:o="urn:schemas-microsoft-com:office:office" xmlns:v="urn:schemas-microsoft-com:vml" xmlns:pvml="urn:schemas-microsoft-com:office:powerpoint" xmlns:com="http://schemas.openxmlformats.org/drawingml/2006/compatibility" xmlns:p14="http://schemas.microsoft.com/office/powerpoint/2010/main">
   <p:cSld>
-    <p:bg>
-      <p:bgPr>
-        <a:solidFill>
-          <a:srgbClr val="000000"/>
-        </a:solidFill>
-      </p:bgPr>
-    </p:bg>
     <p:spTree>
       <p:nvGrpSpPr>
-        <p:cNvPr id="157" name="Shape 157"/>
+        <p:cNvPr id="158" name="Shape 158"/>
         <p:cNvGrpSpPr/>
         <p:nvPr/>
       </p:nvGrpSpPr>
@@ -6682,7 +6848,70 @@
       </p:grpSpPr>
       <p:pic>
         <p:nvPicPr>
-          <p:cNvPr id="158" name="Shape 158"/>
+          <p:cNvPr id="159" name="Shape 159"/>
+          <p:cNvPicPr preferRelativeResize="0"/>
+          <p:nvPr/>
+        </p:nvPicPr>
+        <p:blipFill>
+          <a:blip r:embed="rId3">
+            <a:alphaModFix/>
+          </a:blip>
+          <a:stretch>
+            <a:fillRect/>
+          </a:stretch>
+        </p:blipFill>
+        <p:spPr>
+          <a:xfrm>
+            <a:off x="1243113" y="319000"/>
+            <a:ext cx="6657773" cy="4505500"/>
+          </a:xfrm>
+          <a:prstGeom prst="rect">
+            <a:avLst/>
+          </a:prstGeom>
+          <a:noFill/>
+          <a:ln>
+            <a:noFill/>
+          </a:ln>
+        </p:spPr>
+      </p:pic>
+    </p:spTree>
+  </p:cSld>
+  <p:clrMapOvr>
+    <a:masterClrMapping/>
+  </p:clrMapOvr>
+  <p:transition spd="slow">
+    <p:cut/>
+  </p:transition>
+</p:sld>
+</file>
+
+<file path=ppt/slides/slide19.xml><?xml version="1.0" encoding="utf-8"?>
+<p:sld xmlns:a="http://schemas.openxmlformats.org/drawingml/2006/main" xmlns:r="http://schemas.openxmlformats.org/officeDocument/2006/relationships" xmlns:mc="http://schemas.openxmlformats.org/markup-compatibility/2006" xmlns:mv="urn:schemas-microsoft-com:mac:vml" xmlns:p="http://schemas.openxmlformats.org/presentationml/2006/main" xmlns:c="http://schemas.openxmlformats.org/drawingml/2006/chart" xmlns:dgm="http://schemas.openxmlformats.org/drawingml/2006/diagram" xmlns:o="urn:schemas-microsoft-com:office:office" xmlns:v="urn:schemas-microsoft-com:vml" xmlns:pvml="urn:schemas-microsoft-com:office:powerpoint" xmlns:com="http://schemas.openxmlformats.org/drawingml/2006/compatibility" xmlns:p14="http://schemas.microsoft.com/office/powerpoint/2010/main">
+  <p:cSld>
+    <p:bg>
+      <p:bgPr>
+        <a:solidFill>
+          <a:srgbClr val="000000"/>
+        </a:solidFill>
+      </p:bgPr>
+    </p:bg>
+    <p:spTree>
+      <p:nvGrpSpPr>
+        <p:cNvPr id="163" name="Shape 163"/>
+        <p:cNvGrpSpPr/>
+        <p:nvPr/>
+      </p:nvGrpSpPr>
+      <p:grpSpPr>
+        <a:xfrm>
+          <a:off x="0" y="0"/>
+          <a:ext cx="0" cy="0"/>
+          <a:chOff x="0" y="0"/>
+          <a:chExt cx="0" cy="0"/>
+        </a:xfrm>
+      </p:grpSpPr>
+      <p:pic>
+        <p:nvPicPr>
+          <p:cNvPr id="164" name="Shape 164"/>
           <p:cNvPicPr preferRelativeResize="0"/>
           <p:nvPr/>
         </p:nvPicPr>

</xml_diff>